<commit_message>
Added Batch Processing, Runs from PowerShell 5, 6, 7
</commit_message>
<xml_diff>
--- a/Performance PowerShell/Performance PowerShell.pptx
+++ b/Performance PowerShell/Performance PowerShell.pptx
@@ -9617,11 +9617,7 @@
           <a:p>
             <a:r>
               <a:rPr lang="en-US" dirty="0"/>
-              <a:t>## Write-</a:t>
-            </a:r>
-            <a:r>
-              <a:rPr lang="en-US" dirty="0" err="1"/>
-              <a:t>Ouput</a:t>
+              <a:t>## Write-Output</a:t>
             </a:r>
             <a:br>
               <a:rPr lang="en-US" dirty="0"/>
@@ -22339,15 +22335,6 @@
 </file>
 
 <file path=customXml/item1.xml><?xml version="1.0" encoding="utf-8"?>
-<?mso-contentType ?>
-<FormTemplates xmlns="http://schemas.microsoft.com/sharepoint/v3/contenttype/forms">
-  <Display>DocumentLibraryForm</Display>
-  <Edit>DocumentLibraryForm</Edit>
-  <New>DocumentLibraryForm</New>
-</FormTemplates>
-</file>
-
-<file path=customXml/item2.xml><?xml version="1.0" encoding="utf-8"?>
 <ct:contentTypeSchema xmlns:ct="http://schemas.microsoft.com/office/2006/metadata/contentType" xmlns:ma="http://schemas.microsoft.com/office/2006/metadata/properties/metaAttributes" ct:_="" ma:_="" ma:contentTypeName="Document" ma:contentTypeID="0x010100066787FB9552CF40BFF026EAAC52FBCA" ma:contentTypeVersion="13" ma:contentTypeDescription="Create a new document." ma:contentTypeScope="" ma:versionID="3e67f11690c7d3c18b2a7d7019f4bf93">
   <xsd:schema xmlns:xsd="http://www.w3.org/2001/XMLSchema" xmlns:xs="http://www.w3.org/2001/XMLSchema" xmlns:p="http://schemas.microsoft.com/office/2006/metadata/properties" xmlns:ns2="0f628621-369a-46c7-83bd-de17ca407533" xmlns:ns3="994c1987-0261-432a-b2ef-a9da39f1b5e2" targetNamespace="http://schemas.microsoft.com/office/2006/metadata/properties" ma:root="true" ma:fieldsID="bebd89bf03aaef8daef7a9ce840a4680" ns2:_="" ns3:_="">
     <xsd:import namespace="0f628621-369a-46c7-83bd-de17ca407533"/>
@@ -22572,21 +22559,22 @@
 </ct:contentTypeSchema>
 </file>
 
-<file path=customXml/item3.xml><?xml version="1.0" encoding="utf-8"?>
+<file path=customXml/item2.xml><?xml version="1.0" encoding="utf-8"?>
 <p:properties xmlns:p="http://schemas.microsoft.com/office/2006/metadata/properties" xmlns:xsi="http://www.w3.org/2001/XMLSchema-instance" xmlns:pc="http://schemas.microsoft.com/office/infopath/2007/PartnerControls">
   <documentManagement/>
 </p:properties>
 </file>
 
-<file path=customXml/itemProps1.xml><?xml version="1.0" encoding="utf-8"?>
-<ds:datastoreItem xmlns:ds="http://schemas.openxmlformats.org/officeDocument/2006/customXml" ds:itemID="{8F9099B0-B9E3-45A6-848D-7EA25626C078}">
-  <ds:schemaRefs>
-    <ds:schemaRef ds:uri="http://schemas.microsoft.com/sharepoint/v3/contenttype/forms"/>
-  </ds:schemaRefs>
-</ds:datastoreItem>
+<file path=customXml/item3.xml><?xml version="1.0" encoding="utf-8"?>
+<?mso-contentType ?>
+<FormTemplates xmlns="http://schemas.microsoft.com/sharepoint/v3/contenttype/forms">
+  <Display>DocumentLibraryForm</Display>
+  <Edit>DocumentLibraryForm</Edit>
+  <New>DocumentLibraryForm</New>
+</FormTemplates>
 </file>
 
-<file path=customXml/itemProps2.xml><?xml version="1.0" encoding="utf-8"?>
+<file path=customXml/itemProps1.xml><?xml version="1.0" encoding="utf-8"?>
 <ds:datastoreItem xmlns:ds="http://schemas.openxmlformats.org/officeDocument/2006/customXml" ds:itemID="{CB601562-35ED-457B-BE13-C17612423390}">
   <ds:schemaRefs>
     <ds:schemaRef ds:uri="http://schemas.microsoft.com/office/2006/metadata/contentType"/>
@@ -22605,7 +22593,7 @@
 </ds:datastoreItem>
 </file>
 
-<file path=customXml/itemProps3.xml><?xml version="1.0" encoding="utf-8"?>
+<file path=customXml/itemProps2.xml><?xml version="1.0" encoding="utf-8"?>
 <ds:datastoreItem xmlns:ds="http://schemas.openxmlformats.org/officeDocument/2006/customXml" ds:itemID="{AFF96CB3-579C-4369-8AB2-D91B353AC245}">
   <ds:schemaRefs>
     <ds:schemaRef ds:uri="http://schemas.microsoft.com/office/2006/metadata/properties"/>
@@ -22620,4 +22608,12 @@
     <ds:schemaRef ds:uri="994c1987-0261-432a-b2ef-a9da39f1b5e2"/>
   </ds:schemaRefs>
 </ds:datastoreItem>
+</file>
+
+<file path=customXml/itemProps3.xml><?xml version="1.0" encoding="utf-8"?>
+<ds:datastoreItem xmlns:ds="http://schemas.openxmlformats.org/officeDocument/2006/customXml" ds:itemID="{8F9099B0-B9E3-45A6-848D-7EA25626C078}">
+  <ds:schemaRefs>
+    <ds:schemaRef ds:uri="http://schemas.microsoft.com/sharepoint/v3/contenttype/forms"/>
+  </ds:schemaRefs>
+</ds:datastoreItem>
 </file>
</xml_diff>